<commit_message>
my final AQI Project
</commit_message>
<xml_diff>
--- a/ppt.pptx
+++ b/ppt.pptx
@@ -383,7 +383,7 @@
           <a:p>
             <a:fld id="{238C94E6-6396-49DD-8AAC-CE930AEBA3A0}" type="datetimeFigureOut">
               <a:rPr lang="en-IN" smtClean="0"/>
-              <a:t>20-12-2023</a:t>
+              <a:t>06-07-2024</a:t>
             </a:fld>
             <a:endParaRPr lang="en-IN"/>
           </a:p>
@@ -905,7 +905,7 @@
             <a:fld id="{87DE6118-2437-4B30-8E3C-4D2BE6020583}" type="datetimeFigureOut">
               <a:rPr lang="en-US" dirty="0"/>
               <a:pPr/>
-              <a:t>12/20/2023</a:t>
+              <a:t>7/6/2024</a:t>
             </a:fld>
             <a:endParaRPr lang="en-US" dirty="0"/>
           </a:p>
@@ -1231,7 +1231,7 @@
           <a:p>
             <a:fld id="{87DE6118-2437-4B30-8E3C-4D2BE6020583}" type="datetimeFigureOut">
               <a:rPr lang="en-US" dirty="0"/>
-              <a:t>12/20/2023</a:t>
+              <a:t>7/6/2024</a:t>
             </a:fld>
             <a:endParaRPr lang="en-US" dirty="0"/>
           </a:p>
@@ -1406,7 +1406,7 @@
           <a:p>
             <a:fld id="{87DE6118-2437-4B30-8E3C-4D2BE6020583}" type="datetimeFigureOut">
               <a:rPr lang="en-US" dirty="0"/>
-              <a:t>12/20/2023</a:t>
+              <a:t>7/6/2024</a:t>
             </a:fld>
             <a:endParaRPr lang="en-US" dirty="0"/>
           </a:p>
@@ -1571,7 +1571,7 @@
           <a:p>
             <a:fld id="{87DE6118-2437-4B30-8E3C-4D2BE6020583}" type="datetimeFigureOut">
               <a:rPr lang="en-US" dirty="0"/>
-              <a:t>12/20/2023</a:t>
+              <a:t>7/6/2024</a:t>
             </a:fld>
             <a:endParaRPr lang="en-US" dirty="0"/>
           </a:p>
@@ -1844,7 +1844,7 @@
             <a:fld id="{87DE6118-2437-4B30-8E3C-4D2BE6020583}" type="datetimeFigureOut">
               <a:rPr lang="en-US" dirty="0"/>
               <a:pPr/>
-              <a:t>12/20/2023</a:t>
+              <a:t>7/6/2024</a:t>
             </a:fld>
             <a:endParaRPr lang="en-US" dirty="0"/>
           </a:p>
@@ -2234,7 +2234,7 @@
           <a:p>
             <a:fld id="{87DE6118-2437-4B30-8E3C-4D2BE6020583}" type="datetimeFigureOut">
               <a:rPr lang="en-US" dirty="0"/>
-              <a:t>12/20/2023</a:t>
+              <a:t>7/6/2024</a:t>
             </a:fld>
             <a:endParaRPr lang="en-US" dirty="0"/>
           </a:p>
@@ -2706,7 +2706,7 @@
           <a:p>
             <a:fld id="{87DE6118-2437-4B30-8E3C-4D2BE6020583}" type="datetimeFigureOut">
               <a:rPr lang="en-US" dirty="0"/>
-              <a:t>12/20/2023</a:t>
+              <a:t>7/6/2024</a:t>
             </a:fld>
             <a:endParaRPr lang="en-US" dirty="0"/>
           </a:p>
@@ -2819,7 +2819,7 @@
           <a:p>
             <a:fld id="{87DE6118-2437-4B30-8E3C-4D2BE6020583}" type="datetimeFigureOut">
               <a:rPr lang="en-US" dirty="0"/>
-              <a:t>12/20/2023</a:t>
+              <a:t>7/6/2024</a:t>
             </a:fld>
             <a:endParaRPr lang="en-US" dirty="0"/>
           </a:p>
@@ -2909,7 +2909,7 @@
           <a:p>
             <a:fld id="{87DE6118-2437-4B30-8E3C-4D2BE6020583}" type="datetimeFigureOut">
               <a:rPr lang="en-US" dirty="0"/>
-              <a:t>12/20/2023</a:t>
+              <a:t>7/6/2024</a:t>
             </a:fld>
             <a:endParaRPr lang="en-US" dirty="0"/>
           </a:p>
@@ -3251,7 +3251,7 @@
             <a:fld id="{87DE6118-2437-4B30-8E3C-4D2BE6020583}" type="datetimeFigureOut">
               <a:rPr lang="en-US" dirty="0"/>
               <a:pPr/>
-              <a:t>12/20/2023</a:t>
+              <a:t>7/6/2024</a:t>
             </a:fld>
             <a:endParaRPr lang="en-US" dirty="0"/>
           </a:p>
@@ -3636,7 +3636,7 @@
             <a:fld id="{87DE6118-2437-4B30-8E3C-4D2BE6020583}" type="datetimeFigureOut">
               <a:rPr lang="en-US" dirty="0"/>
               <a:pPr/>
-              <a:t>12/20/2023</a:t>
+              <a:t>7/6/2024</a:t>
             </a:fld>
             <a:endParaRPr lang="en-US" dirty="0"/>
           </a:p>
@@ -3911,7 +3911,7 @@
             <a:fld id="{87DE6118-2437-4B30-8E3C-4D2BE6020583}" type="datetimeFigureOut">
               <a:rPr lang="en-US" dirty="0"/>
               <a:pPr/>
-              <a:t>12/20/2023</a:t>
+              <a:t>7/6/2024</a:t>
             </a:fld>
             <a:endParaRPr lang="en-US" dirty="0"/>
           </a:p>
@@ -4690,7 +4690,7 @@
                 <a:ea typeface="Calibri" panose="020F0502020204030204" pitchFamily="34" charset="0"/>
                 <a:cs typeface="Calibri" panose="020F0502020204030204" pitchFamily="34" charset="0"/>
               </a:rPr>
-              <a:t>Your Solution and its Value Proposition</a:t>
+              <a:t>Our Solution and its Value Proposition</a:t>
             </a:r>
           </a:p>
           <a:p>
@@ -4700,7 +4700,7 @@
                 <a:ea typeface="Calibri" panose="020F0502020204030204" pitchFamily="34" charset="0"/>
                 <a:cs typeface="Calibri" panose="020F0502020204030204" pitchFamily="34" charset="0"/>
               </a:rPr>
-              <a:t>The Wow in Your Solution</a:t>
+              <a:t>The Wow in Our Solution</a:t>
             </a:r>
           </a:p>
           <a:p>
@@ -5374,7 +5374,7 @@
           <a:p>
             <a:r>
               <a:rPr lang="en-US" sz="4400" dirty="0"/>
-              <a:t>YOUR SOLUTION AND ITS VALUE PROPOSITION</a:t>
+              <a:t>OUR SOLUTION AND ITS VALUE PROPOSITION</a:t>
             </a:r>
             <a:endParaRPr lang="en-IN" dirty="0"/>
           </a:p>
@@ -5634,7 +5634,7 @@
           <a:p>
             <a:r>
               <a:rPr lang="en-US" dirty="0"/>
-              <a:t>THE WOW IN YOUR SOLUTION</a:t>
+              <a:t>THE WOW IN OUR SOLUTION</a:t>
             </a:r>
             <a:endParaRPr lang="en-IN" dirty="0"/>
           </a:p>
@@ -6573,6 +6573,23 @@
 </file>
 
 <file path=customXml/item1.xml><?xml version="1.0" encoding="utf-8"?>
+<?mso-contentType ?>
+<FormTemplates xmlns="http://schemas.microsoft.com/sharepoint/v3/contenttype/forms">
+  <Display>DocumentLibraryForm</Display>
+  <Edit>DocumentLibraryForm</Edit>
+  <New>DocumentLibraryForm</New>
+</FormTemplates>
+</file>
+
+<file path=customXml/item2.xml><?xml version="1.0" encoding="utf-8"?>
+<p:properties xmlns:p="http://schemas.microsoft.com/office/2006/metadata/properties" xmlns:xsi="http://www.w3.org/2001/XMLSchema-instance" xmlns:pc="http://schemas.microsoft.com/office/infopath/2007/PartnerControls">
+  <documentManagement>
+    <_activity xmlns="2081e5d7-f4f6-47ac-bbd5-dc5e91184e20" xsi:nil="true"/>
+  </documentManagement>
+</p:properties>
+</file>
+
+<file path=customXml/item3.xml><?xml version="1.0" encoding="utf-8"?>
 <ct:contentTypeSchema xmlns:ct="http://schemas.microsoft.com/office/2006/metadata/contentType" xmlns:ma="http://schemas.microsoft.com/office/2006/metadata/properties/metaAttributes" ct:_="" ma:_="" ma:contentTypeName="Document" ma:contentTypeID="0x010100037FCB274D910C478E653640A31BE046" ma:contentTypeVersion="15" ma:contentTypeDescription="Create a new document." ma:contentTypeScope="" ma:versionID="538b64e3425d3a0df45f810cd5ebb783">
   <xsd:schema xmlns:xsd="http://www.w3.org/2001/XMLSchema" xmlns:xs="http://www.w3.org/2001/XMLSchema" xmlns:p="http://schemas.microsoft.com/office/2006/metadata/properties" xmlns:ns3="2081e5d7-f4f6-47ac-bbd5-dc5e91184e20" xmlns:ns4="aeb9c99d-b56a-44d7-ba51-e09114b3e757" targetNamespace="http://schemas.microsoft.com/office/2006/metadata/properties" ma:root="true" ma:fieldsID="9ac1bf5abf9183592f4e61027774c58c" ns3:_="" ns4:_="">
     <xsd:import namespace="2081e5d7-f4f6-47ac-bbd5-dc5e91184e20"/>
@@ -6807,24 +6824,27 @@
 </ct:contentTypeSchema>
 </file>
 
-<file path=customXml/item2.xml><?xml version="1.0" encoding="utf-8"?>
-<p:properties xmlns:p="http://schemas.microsoft.com/office/2006/metadata/properties" xmlns:xsi="http://www.w3.org/2001/XMLSchema-instance" xmlns:pc="http://schemas.microsoft.com/office/infopath/2007/PartnerControls">
-  <documentManagement>
-    <_activity xmlns="2081e5d7-f4f6-47ac-bbd5-dc5e91184e20" xsi:nil="true"/>
-  </documentManagement>
-</p:properties>
+<file path=customXml/itemProps1.xml><?xml version="1.0" encoding="utf-8"?>
+<ds:datastoreItem xmlns:ds="http://schemas.openxmlformats.org/officeDocument/2006/customXml" ds:itemID="{4B382EE4-9AAC-4237-9930-7CBA21586C86}">
+  <ds:schemaRefs>
+    <ds:schemaRef ds:uri="http://schemas.microsoft.com/sharepoint/v3/contenttype/forms"/>
+  </ds:schemaRefs>
+</ds:datastoreItem>
 </file>
 
-<file path=customXml/item3.xml><?xml version="1.0" encoding="utf-8"?>
-<?mso-contentType ?>
-<FormTemplates xmlns="http://schemas.microsoft.com/sharepoint/v3/contenttype/forms">
-  <Display>DocumentLibraryForm</Display>
-  <Edit>DocumentLibraryForm</Edit>
-  <New>DocumentLibraryForm</New>
-</FormTemplates>
+<file path=customXml/itemProps2.xml><?xml version="1.0" encoding="utf-8"?>
+<ds:datastoreItem xmlns:ds="http://schemas.openxmlformats.org/officeDocument/2006/customXml" ds:itemID="{FE70D75A-D82E-4B0C-8D7E-FD9B5D313F37}">
+  <ds:schemaRefs>
+    <ds:schemaRef ds:uri="http://schemas.microsoft.com/office/2006/metadata/properties"/>
+    <ds:schemaRef ds:uri="http://www.w3.org/2000/xmlns/"/>
+    <ds:schemaRef ds:uri="2081e5d7-f4f6-47ac-bbd5-dc5e91184e20"/>
+    <ds:schemaRef ds:uri="http://www.w3.org/2001/XMLSchema-instance"/>
+    <ds:schemaRef ds:uri="http://schemas.microsoft.com/office/infopath/2007/PartnerControls"/>
+  </ds:schemaRefs>
+</ds:datastoreItem>
 </file>
 
-<file path=customXml/itemProps1.xml><?xml version="1.0" encoding="utf-8"?>
+<file path=customXml/itemProps3.xml><?xml version="1.0" encoding="utf-8"?>
 <ds:datastoreItem xmlns:ds="http://schemas.openxmlformats.org/officeDocument/2006/customXml" ds:itemID="{5D5E5F00-3619-47A3-B3A5-B9BF908EB823}">
   <ds:schemaRefs>
     <ds:schemaRef ds:uri="http://schemas.microsoft.com/office/2006/metadata/contentType"/>
@@ -6842,24 +6862,4 @@
     <ds:schemaRef ds:uri="http://schemas.microsoft.com/internal/obd"/>
   </ds:schemaRefs>
 </ds:datastoreItem>
-</file>
-
-<file path=customXml/itemProps2.xml><?xml version="1.0" encoding="utf-8"?>
-<ds:datastoreItem xmlns:ds="http://schemas.openxmlformats.org/officeDocument/2006/customXml" ds:itemID="{FE70D75A-D82E-4B0C-8D7E-FD9B5D313F37}">
-  <ds:schemaRefs>
-    <ds:schemaRef ds:uri="http://schemas.microsoft.com/office/2006/metadata/properties"/>
-    <ds:schemaRef ds:uri="http://www.w3.org/2000/xmlns/"/>
-    <ds:schemaRef ds:uri="2081e5d7-f4f6-47ac-bbd5-dc5e91184e20"/>
-    <ds:schemaRef ds:uri="http://www.w3.org/2001/XMLSchema-instance"/>
-    <ds:schemaRef ds:uri="http://schemas.microsoft.com/office/infopath/2007/PartnerControls"/>
-  </ds:schemaRefs>
-</ds:datastoreItem>
-</file>
-
-<file path=customXml/itemProps3.xml><?xml version="1.0" encoding="utf-8"?>
-<ds:datastoreItem xmlns:ds="http://schemas.openxmlformats.org/officeDocument/2006/customXml" ds:itemID="{4B382EE4-9AAC-4237-9930-7CBA21586C86}">
-  <ds:schemaRefs>
-    <ds:schemaRef ds:uri="http://schemas.microsoft.com/sharepoint/v3/contenttype/forms"/>
-  </ds:schemaRefs>
-</ds:datastoreItem>
 </file>
</xml_diff>